<commit_message>
Iniciado capítulo do estado da arte
- Adicionado o subcapítulo da vala recoberta
</commit_message>
<xml_diff>
--- a/fig/powerpoint/Figuras_desenhadas.pptx
+++ b/fig/powerpoint/Figuras_desenhadas.pptx
@@ -6,6 +6,8 @@
   </p:sldMasterIdLst>
   <p:sldIdLst>
     <p:sldId id="256" r:id="rId2"/>
+    <p:sldId id="257" r:id="rId3"/>
+    <p:sldId id="258" r:id="rId4"/>
   </p:sldIdLst>
   <p:sldSz cx="9144000" cy="6858000" type="screen4x3"/>
   <p:notesSz cx="6858000" cy="9144000"/>
@@ -3621,6 +3623,937 @@
     <p:extLst>
       <p:ext uri="{BB962C8B-B14F-4D97-AF65-F5344CB8AC3E}">
         <p14:creationId xmlns:p14="http://schemas.microsoft.com/office/powerpoint/2010/main" val="887980024"/>
+      </p:ext>
+    </p:extLst>
+  </p:cSld>
+  <p:clrMapOvr>
+    <a:masterClrMapping/>
+  </p:clrMapOvr>
+</p:sld>
+</file>
+
+<file path=ppt/slides/slide2.xml><?xml version="1.0" encoding="utf-8"?>
+<p:sld xmlns:a="http://schemas.openxmlformats.org/drawingml/2006/main" xmlns:r="http://schemas.openxmlformats.org/officeDocument/2006/relationships" xmlns:p="http://schemas.openxmlformats.org/presentationml/2006/main">
+  <p:cSld>
+    <p:spTree>
+      <p:nvGrpSpPr>
+        <p:cNvPr id="1" name=""/>
+        <p:cNvGrpSpPr/>
+        <p:nvPr/>
+      </p:nvGrpSpPr>
+      <p:grpSpPr>
+        <a:xfrm>
+          <a:off x="0" y="0"/>
+          <a:ext cx="0" cy="0"/>
+          <a:chOff x="0" y="0"/>
+          <a:chExt cx="0" cy="0"/>
+        </a:xfrm>
+      </p:grpSpPr>
+      <p:sp>
+        <p:nvSpPr>
+          <p:cNvPr id="2" name="Retângulo 1">
+            <a:extLst>
+              <a:ext uri="{FF2B5EF4-FFF2-40B4-BE49-F238E27FC236}">
+                <a16:creationId xmlns:a16="http://schemas.microsoft.com/office/drawing/2014/main" id="{F17B0960-6F8D-4C43-A587-A0BF9C75E3F7}"/>
+              </a:ext>
+            </a:extLst>
+          </p:cNvPr>
+          <p:cNvSpPr/>
+          <p:nvPr/>
+        </p:nvSpPr>
+        <p:spPr>
+          <a:xfrm>
+            <a:off x="1187624" y="2311827"/>
+            <a:ext cx="1512168" cy="588065"/>
+          </a:xfrm>
+          <a:prstGeom prst="rect">
+            <a:avLst/>
+          </a:prstGeom>
+        </p:spPr>
+        <p:style>
+          <a:lnRef idx="2">
+            <a:schemeClr val="dk1"/>
+          </a:lnRef>
+          <a:fillRef idx="1">
+            <a:schemeClr val="lt1"/>
+          </a:fillRef>
+          <a:effectRef idx="0">
+            <a:schemeClr val="dk1"/>
+          </a:effectRef>
+          <a:fontRef idx="minor">
+            <a:schemeClr val="dk1"/>
+          </a:fontRef>
+        </p:style>
+        <p:txBody>
+          <a:bodyPr rtlCol="0" anchor="ctr"/>
+          <a:lstStyle/>
+          <a:p>
+            <a:pPr algn="ctr"/>
+            <a:r>
+              <a:rPr lang="pt-BR" sz="1200" b="1" dirty="0">
+                <a:latin typeface="Times New Roman" panose="02020603050405020304" pitchFamily="18" charset="0"/>
+                <a:cs typeface="Times New Roman" panose="02020603050405020304" pitchFamily="18" charset="0"/>
+              </a:rPr>
+              <a:t>1) NÃO MECANIZADOS</a:t>
+            </a:r>
+          </a:p>
+        </p:txBody>
+      </p:sp>
+      <p:sp>
+        <p:nvSpPr>
+          <p:cNvPr id="14" name="Retângulo 13">
+            <a:extLst>
+              <a:ext uri="{FF2B5EF4-FFF2-40B4-BE49-F238E27FC236}">
+                <a16:creationId xmlns:a16="http://schemas.microsoft.com/office/drawing/2014/main" id="{105E0361-BD72-4BDD-84DD-EB851B099AB0}"/>
+              </a:ext>
+            </a:extLst>
+          </p:cNvPr>
+          <p:cNvSpPr/>
+          <p:nvPr/>
+        </p:nvSpPr>
+        <p:spPr>
+          <a:xfrm>
+            <a:off x="1196132" y="4460162"/>
+            <a:ext cx="1512168" cy="588065"/>
+          </a:xfrm>
+          <a:prstGeom prst="rect">
+            <a:avLst/>
+          </a:prstGeom>
+        </p:spPr>
+        <p:style>
+          <a:lnRef idx="2">
+            <a:schemeClr val="dk1"/>
+          </a:lnRef>
+          <a:fillRef idx="1">
+            <a:schemeClr val="lt1"/>
+          </a:fillRef>
+          <a:effectRef idx="0">
+            <a:schemeClr val="dk1"/>
+          </a:effectRef>
+          <a:fontRef idx="minor">
+            <a:schemeClr val="dk1"/>
+          </a:fontRef>
+        </p:style>
+        <p:txBody>
+          <a:bodyPr rtlCol="0" anchor="ctr"/>
+          <a:lstStyle/>
+          <a:p>
+            <a:pPr algn="ctr"/>
+            <a:r>
+              <a:rPr lang="pt-BR" sz="1200" b="1" dirty="0">
+                <a:latin typeface="Times New Roman" panose="02020603050405020304" pitchFamily="18" charset="0"/>
+                <a:cs typeface="Times New Roman" panose="02020603050405020304" pitchFamily="18" charset="0"/>
+              </a:rPr>
+              <a:t>2) MECANIZADOS</a:t>
+            </a:r>
+          </a:p>
+        </p:txBody>
+      </p:sp>
+      <p:sp>
+        <p:nvSpPr>
+          <p:cNvPr id="16" name="Retângulo 15">
+            <a:extLst>
+              <a:ext uri="{FF2B5EF4-FFF2-40B4-BE49-F238E27FC236}">
+                <a16:creationId xmlns:a16="http://schemas.microsoft.com/office/drawing/2014/main" id="{A07F5E3C-0C5D-463A-9444-B1AFA944C09B}"/>
+              </a:ext>
+            </a:extLst>
+          </p:cNvPr>
+          <p:cNvSpPr/>
+          <p:nvPr/>
+        </p:nvSpPr>
+        <p:spPr>
+          <a:xfrm>
+            <a:off x="3923928" y="1147604"/>
+            <a:ext cx="2952328" cy="720080"/>
+          </a:xfrm>
+          <a:prstGeom prst="rect">
+            <a:avLst/>
+          </a:prstGeom>
+        </p:spPr>
+        <p:style>
+          <a:lnRef idx="2">
+            <a:schemeClr val="dk1"/>
+          </a:lnRef>
+          <a:fillRef idx="1">
+            <a:schemeClr val="lt1"/>
+          </a:fillRef>
+          <a:effectRef idx="0">
+            <a:schemeClr val="dk1"/>
+          </a:effectRef>
+          <a:fontRef idx="minor">
+            <a:schemeClr val="dk1"/>
+          </a:fontRef>
+        </p:style>
+        <p:txBody>
+          <a:bodyPr rtlCol="0" anchor="ctr"/>
+          <a:lstStyle/>
+          <a:p>
+            <a:r>
+              <a:rPr lang="pt-BR" sz="1200" b="1" dirty="0">
+                <a:latin typeface="Times New Roman" panose="02020603050405020304" pitchFamily="18" charset="0"/>
+                <a:cs typeface="Times New Roman" panose="02020603050405020304" pitchFamily="18" charset="0"/>
+              </a:rPr>
+              <a:t>1.1) VALA RECOBERTA</a:t>
+            </a:r>
+          </a:p>
+          <a:p>
+            <a:r>
+              <a:rPr lang="pt-BR" sz="1200" dirty="0">
+                <a:latin typeface="Times New Roman" panose="02020603050405020304" pitchFamily="18" charset="0"/>
+                <a:cs typeface="Times New Roman" panose="02020603050405020304" pitchFamily="18" charset="0"/>
+              </a:rPr>
+              <a:t>Método Direto (</a:t>
+            </a:r>
+            <a:r>
+              <a:rPr lang="pt-BR" sz="1200" i="1" dirty="0" err="1">
+                <a:latin typeface="Times New Roman" panose="02020603050405020304" pitchFamily="18" charset="0"/>
+                <a:cs typeface="Times New Roman" panose="02020603050405020304" pitchFamily="18" charset="0"/>
+              </a:rPr>
+              <a:t>Cut</a:t>
+            </a:r>
+            <a:r>
+              <a:rPr lang="pt-BR" sz="1200" i="1" dirty="0">
+                <a:latin typeface="Times New Roman" panose="02020603050405020304" pitchFamily="18" charset="0"/>
+                <a:cs typeface="Times New Roman" panose="02020603050405020304" pitchFamily="18" charset="0"/>
+              </a:rPr>
+              <a:t> </a:t>
+            </a:r>
+            <a:r>
+              <a:rPr lang="pt-BR" sz="1200" i="1" dirty="0" err="1">
+                <a:latin typeface="Times New Roman" panose="02020603050405020304" pitchFamily="18" charset="0"/>
+                <a:cs typeface="Times New Roman" panose="02020603050405020304" pitchFamily="18" charset="0"/>
+              </a:rPr>
+              <a:t>and</a:t>
+            </a:r>
+            <a:r>
+              <a:rPr lang="pt-BR" sz="1200" i="1" dirty="0">
+                <a:latin typeface="Times New Roman" panose="02020603050405020304" pitchFamily="18" charset="0"/>
+                <a:cs typeface="Times New Roman" panose="02020603050405020304" pitchFamily="18" charset="0"/>
+              </a:rPr>
+              <a:t> Cover</a:t>
+            </a:r>
+            <a:r>
+              <a:rPr lang="pt-BR" sz="1200" dirty="0">
+                <a:latin typeface="Times New Roman" panose="02020603050405020304" pitchFamily="18" charset="0"/>
+                <a:cs typeface="Times New Roman" panose="02020603050405020304" pitchFamily="18" charset="0"/>
+              </a:rPr>
+              <a:t>)</a:t>
+            </a:r>
+          </a:p>
+          <a:p>
+            <a:r>
+              <a:rPr lang="pt-BR" sz="1200" dirty="0">
+                <a:latin typeface="Times New Roman" panose="02020603050405020304" pitchFamily="18" charset="0"/>
+                <a:cs typeface="Times New Roman" panose="02020603050405020304" pitchFamily="18" charset="0"/>
+              </a:rPr>
+              <a:t>Método Invertido (</a:t>
+            </a:r>
+            <a:r>
+              <a:rPr lang="pt-BR" sz="1200" i="1" dirty="0">
+                <a:latin typeface="Times New Roman" panose="02020603050405020304" pitchFamily="18" charset="0"/>
+                <a:cs typeface="Times New Roman" panose="02020603050405020304" pitchFamily="18" charset="0"/>
+              </a:rPr>
+              <a:t>Cover </a:t>
+            </a:r>
+            <a:r>
+              <a:rPr lang="pt-BR" sz="1200" i="1" dirty="0" err="1">
+                <a:latin typeface="Times New Roman" panose="02020603050405020304" pitchFamily="18" charset="0"/>
+                <a:cs typeface="Times New Roman" panose="02020603050405020304" pitchFamily="18" charset="0"/>
+              </a:rPr>
+              <a:t>and</a:t>
+            </a:r>
+            <a:r>
+              <a:rPr lang="pt-BR" sz="1200" i="1" dirty="0">
+                <a:latin typeface="Times New Roman" panose="02020603050405020304" pitchFamily="18" charset="0"/>
+                <a:cs typeface="Times New Roman" panose="02020603050405020304" pitchFamily="18" charset="0"/>
+              </a:rPr>
+              <a:t> </a:t>
+            </a:r>
+            <a:r>
+              <a:rPr lang="pt-BR" sz="1200" i="1" dirty="0" err="1">
+                <a:latin typeface="Times New Roman" panose="02020603050405020304" pitchFamily="18" charset="0"/>
+                <a:cs typeface="Times New Roman" panose="02020603050405020304" pitchFamily="18" charset="0"/>
+              </a:rPr>
+              <a:t>Cut</a:t>
+            </a:r>
+            <a:r>
+              <a:rPr lang="pt-BR" sz="1200" dirty="0">
+                <a:latin typeface="Times New Roman" panose="02020603050405020304" pitchFamily="18" charset="0"/>
+                <a:cs typeface="Times New Roman" panose="02020603050405020304" pitchFamily="18" charset="0"/>
+              </a:rPr>
+              <a:t>)</a:t>
+            </a:r>
+          </a:p>
+        </p:txBody>
+      </p:sp>
+      <p:sp>
+        <p:nvSpPr>
+          <p:cNvPr id="18" name="Retângulo 17">
+            <a:extLst>
+              <a:ext uri="{FF2B5EF4-FFF2-40B4-BE49-F238E27FC236}">
+                <a16:creationId xmlns:a16="http://schemas.microsoft.com/office/drawing/2014/main" id="{D5589711-E7B3-485E-B681-635E463266B1}"/>
+              </a:ext>
+            </a:extLst>
+          </p:cNvPr>
+          <p:cNvSpPr/>
+          <p:nvPr/>
+        </p:nvSpPr>
+        <p:spPr>
+          <a:xfrm>
+            <a:off x="3923928" y="1940835"/>
+            <a:ext cx="2952328" cy="1344149"/>
+          </a:xfrm>
+          <a:prstGeom prst="rect">
+            <a:avLst/>
+          </a:prstGeom>
+        </p:spPr>
+        <p:style>
+          <a:lnRef idx="2">
+            <a:schemeClr val="dk1"/>
+          </a:lnRef>
+          <a:fillRef idx="1">
+            <a:schemeClr val="lt1"/>
+          </a:fillRef>
+          <a:effectRef idx="0">
+            <a:schemeClr val="dk1"/>
+          </a:effectRef>
+          <a:fontRef idx="minor">
+            <a:schemeClr val="dk1"/>
+          </a:fontRef>
+        </p:style>
+        <p:txBody>
+          <a:bodyPr rtlCol="0" anchor="ctr"/>
+          <a:lstStyle/>
+          <a:p>
+            <a:r>
+              <a:rPr lang="pt-BR" sz="1200" b="1" dirty="0">
+                <a:latin typeface="Times New Roman" panose="02020603050405020304" pitchFamily="18" charset="0"/>
+                <a:cs typeface="Times New Roman" panose="02020603050405020304" pitchFamily="18" charset="0"/>
+              </a:rPr>
+              <a:t>1.2) ESCAVAÇÃO SIMPLES</a:t>
+            </a:r>
+          </a:p>
+          <a:p>
+            <a:r>
+              <a:rPr lang="pt-BR" sz="1200" dirty="0">
+                <a:latin typeface="Times New Roman" panose="02020603050405020304" pitchFamily="18" charset="0"/>
+                <a:cs typeface="Times New Roman" panose="02020603050405020304" pitchFamily="18" charset="0"/>
+              </a:rPr>
+              <a:t>Equipamentos manuais</a:t>
+            </a:r>
+          </a:p>
+          <a:p>
+            <a:r>
+              <a:rPr lang="pt-BR" sz="1200" dirty="0">
+                <a:latin typeface="Times New Roman" panose="02020603050405020304" pitchFamily="18" charset="0"/>
+                <a:cs typeface="Times New Roman" panose="02020603050405020304" pitchFamily="18" charset="0"/>
+              </a:rPr>
+              <a:t>Escavadeiras</a:t>
+            </a:r>
+          </a:p>
+          <a:p>
+            <a:r>
+              <a:rPr lang="pt-BR" sz="1200" dirty="0">
+                <a:latin typeface="Times New Roman" panose="02020603050405020304" pitchFamily="18" charset="0"/>
+                <a:cs typeface="Times New Roman" panose="02020603050405020304" pitchFamily="18" charset="0"/>
+              </a:rPr>
+              <a:t>Escavadeira rotativa (</a:t>
+            </a:r>
+            <a:r>
+              <a:rPr lang="pt-BR" sz="1200" i="1" dirty="0" err="1">
+                <a:latin typeface="Times New Roman" panose="02020603050405020304" pitchFamily="18" charset="0"/>
+                <a:cs typeface="Times New Roman" panose="02020603050405020304" pitchFamily="18" charset="0"/>
+              </a:rPr>
+              <a:t>Roadheader</a:t>
+            </a:r>
+            <a:r>
+              <a:rPr lang="pt-BR" sz="1200" dirty="0">
+                <a:latin typeface="Times New Roman" panose="02020603050405020304" pitchFamily="18" charset="0"/>
+                <a:cs typeface="Times New Roman" panose="02020603050405020304" pitchFamily="18" charset="0"/>
+              </a:rPr>
+              <a:t>)</a:t>
+            </a:r>
+          </a:p>
+          <a:p>
+            <a:r>
+              <a:rPr lang="pt-BR" sz="1200" dirty="0" err="1">
+                <a:latin typeface="Times New Roman" panose="02020603050405020304" pitchFamily="18" charset="0"/>
+                <a:cs typeface="Times New Roman" panose="02020603050405020304" pitchFamily="18" charset="0"/>
+              </a:rPr>
+              <a:t>Escarificadoras</a:t>
+            </a:r>
+            <a:endParaRPr lang="pt-BR" sz="1200" dirty="0">
+              <a:latin typeface="Times New Roman" panose="02020603050405020304" pitchFamily="18" charset="0"/>
+              <a:cs typeface="Times New Roman" panose="02020603050405020304" pitchFamily="18" charset="0"/>
+            </a:endParaRPr>
+          </a:p>
+          <a:p>
+            <a:r>
+              <a:rPr lang="pt-BR" sz="1200" dirty="0">
+                <a:latin typeface="Times New Roman" panose="02020603050405020304" pitchFamily="18" charset="0"/>
+                <a:cs typeface="Times New Roman" panose="02020603050405020304" pitchFamily="18" charset="0"/>
+              </a:rPr>
+              <a:t>Martelo Hidráulico (</a:t>
+            </a:r>
+            <a:r>
+              <a:rPr lang="pt-BR" sz="1200" i="1" dirty="0" err="1">
+                <a:latin typeface="Times New Roman" panose="02020603050405020304" pitchFamily="18" charset="0"/>
+                <a:cs typeface="Times New Roman" panose="02020603050405020304" pitchFamily="18" charset="0"/>
+              </a:rPr>
+              <a:t>Hammerhead</a:t>
+            </a:r>
+            <a:r>
+              <a:rPr lang="pt-BR" sz="1200" dirty="0">
+                <a:latin typeface="Times New Roman" panose="02020603050405020304" pitchFamily="18" charset="0"/>
+                <a:cs typeface="Times New Roman" panose="02020603050405020304" pitchFamily="18" charset="0"/>
+              </a:rPr>
+              <a:t>)</a:t>
+            </a:r>
+          </a:p>
+        </p:txBody>
+      </p:sp>
+      <p:sp>
+        <p:nvSpPr>
+          <p:cNvPr id="19" name="Retângulo 18">
+            <a:extLst>
+              <a:ext uri="{FF2B5EF4-FFF2-40B4-BE49-F238E27FC236}">
+                <a16:creationId xmlns:a16="http://schemas.microsoft.com/office/drawing/2014/main" id="{73EFFE2E-4023-426A-AE78-1CBB002269E4}"/>
+              </a:ext>
+            </a:extLst>
+          </p:cNvPr>
+          <p:cNvSpPr/>
+          <p:nvPr/>
+        </p:nvSpPr>
+        <p:spPr>
+          <a:xfrm>
+            <a:off x="3923928" y="3356992"/>
+            <a:ext cx="2952328" cy="588065"/>
+          </a:xfrm>
+          <a:prstGeom prst="rect">
+            <a:avLst/>
+          </a:prstGeom>
+        </p:spPr>
+        <p:style>
+          <a:lnRef idx="2">
+            <a:schemeClr val="dk1"/>
+          </a:lnRef>
+          <a:fillRef idx="1">
+            <a:schemeClr val="lt1"/>
+          </a:fillRef>
+          <a:effectRef idx="0">
+            <a:schemeClr val="dk1"/>
+          </a:effectRef>
+          <a:fontRef idx="minor">
+            <a:schemeClr val="dk1"/>
+          </a:fontRef>
+        </p:style>
+        <p:txBody>
+          <a:bodyPr rtlCol="0" anchor="ctr"/>
+          <a:lstStyle/>
+          <a:p>
+            <a:r>
+              <a:rPr lang="pt-BR" sz="1200" b="1" dirty="0">
+                <a:latin typeface="Times New Roman" panose="02020603050405020304" pitchFamily="18" charset="0"/>
+                <a:cs typeface="Times New Roman" panose="02020603050405020304" pitchFamily="18" charset="0"/>
+              </a:rPr>
+              <a:t>1.3) DESMONTE DE ROCHA</a:t>
+            </a:r>
+          </a:p>
+          <a:p>
+            <a:r>
+              <a:rPr lang="pt-BR" sz="1200" dirty="0">
+                <a:latin typeface="Times New Roman" panose="02020603050405020304" pitchFamily="18" charset="0"/>
+                <a:cs typeface="Times New Roman" panose="02020603050405020304" pitchFamily="18" charset="0"/>
+              </a:rPr>
+              <a:t>Perfurar e explodir (</a:t>
+            </a:r>
+            <a:r>
+              <a:rPr lang="pt-BR" sz="1200" i="1" dirty="0" err="1">
+                <a:latin typeface="Times New Roman" panose="02020603050405020304" pitchFamily="18" charset="0"/>
+                <a:cs typeface="Times New Roman" panose="02020603050405020304" pitchFamily="18" charset="0"/>
+              </a:rPr>
+              <a:t>Drill</a:t>
+            </a:r>
+            <a:r>
+              <a:rPr lang="pt-BR" sz="1200" i="1" dirty="0">
+                <a:latin typeface="Times New Roman" panose="02020603050405020304" pitchFamily="18" charset="0"/>
+                <a:cs typeface="Times New Roman" panose="02020603050405020304" pitchFamily="18" charset="0"/>
+              </a:rPr>
+              <a:t> </a:t>
+            </a:r>
+            <a:r>
+              <a:rPr lang="pt-BR" sz="1200" i="1" dirty="0" err="1">
+                <a:latin typeface="Times New Roman" panose="02020603050405020304" pitchFamily="18" charset="0"/>
+                <a:cs typeface="Times New Roman" panose="02020603050405020304" pitchFamily="18" charset="0"/>
+              </a:rPr>
+              <a:t>and</a:t>
+            </a:r>
+            <a:r>
+              <a:rPr lang="pt-BR" sz="1200" i="1" dirty="0">
+                <a:latin typeface="Times New Roman" panose="02020603050405020304" pitchFamily="18" charset="0"/>
+                <a:cs typeface="Times New Roman" panose="02020603050405020304" pitchFamily="18" charset="0"/>
+              </a:rPr>
+              <a:t> </a:t>
+            </a:r>
+            <a:r>
+              <a:rPr lang="pt-BR" sz="1200" i="1" dirty="0" err="1">
+                <a:latin typeface="Times New Roman" panose="02020603050405020304" pitchFamily="18" charset="0"/>
+                <a:cs typeface="Times New Roman" panose="02020603050405020304" pitchFamily="18" charset="0"/>
+              </a:rPr>
+              <a:t>Blast</a:t>
+            </a:r>
+            <a:r>
+              <a:rPr lang="pt-BR" sz="1200" dirty="0">
+                <a:latin typeface="Times New Roman" panose="02020603050405020304" pitchFamily="18" charset="0"/>
+                <a:cs typeface="Times New Roman" panose="02020603050405020304" pitchFamily="18" charset="0"/>
+              </a:rPr>
+              <a:t>)</a:t>
+            </a:r>
+          </a:p>
+        </p:txBody>
+      </p:sp>
+      <p:sp>
+        <p:nvSpPr>
+          <p:cNvPr id="20" name="Retângulo 19">
+            <a:extLst>
+              <a:ext uri="{FF2B5EF4-FFF2-40B4-BE49-F238E27FC236}">
+                <a16:creationId xmlns:a16="http://schemas.microsoft.com/office/drawing/2014/main" id="{CF5FDB7B-50A8-49B1-8AEF-606767C8701E}"/>
+              </a:ext>
+            </a:extLst>
+          </p:cNvPr>
+          <p:cNvSpPr/>
+          <p:nvPr/>
+        </p:nvSpPr>
+        <p:spPr>
+          <a:xfrm>
+            <a:off x="3923928" y="4027924"/>
+            <a:ext cx="2952328" cy="672075"/>
+          </a:xfrm>
+          <a:prstGeom prst="rect">
+            <a:avLst/>
+          </a:prstGeom>
+        </p:spPr>
+        <p:style>
+          <a:lnRef idx="2">
+            <a:schemeClr val="dk1"/>
+          </a:lnRef>
+          <a:fillRef idx="1">
+            <a:schemeClr val="lt1"/>
+          </a:fillRef>
+          <a:effectRef idx="0">
+            <a:schemeClr val="dk1"/>
+          </a:effectRef>
+          <a:fontRef idx="minor">
+            <a:schemeClr val="dk1"/>
+          </a:fontRef>
+        </p:style>
+        <p:txBody>
+          <a:bodyPr rtlCol="0" anchor="ctr"/>
+          <a:lstStyle/>
+          <a:p>
+            <a:r>
+              <a:rPr lang="pt-BR" sz="1200" b="1" dirty="0">
+                <a:latin typeface="Times New Roman" panose="02020603050405020304" pitchFamily="18" charset="0"/>
+                <a:cs typeface="Times New Roman" panose="02020603050405020304" pitchFamily="18" charset="0"/>
+              </a:rPr>
+              <a:t>2.1) TUNELADORAS</a:t>
+            </a:r>
+          </a:p>
+          <a:p>
+            <a:r>
+              <a:rPr lang="pt-BR" sz="1200" dirty="0">
+                <a:latin typeface="Times New Roman" panose="02020603050405020304" pitchFamily="18" charset="0"/>
+                <a:cs typeface="Times New Roman" panose="02020603050405020304" pitchFamily="18" charset="0"/>
+              </a:rPr>
+              <a:t>(</a:t>
+            </a:r>
+            <a:r>
+              <a:rPr lang="pt-BR" sz="1200" i="1" dirty="0" err="1">
+                <a:latin typeface="Times New Roman" panose="02020603050405020304" pitchFamily="18" charset="0"/>
+                <a:cs typeface="Times New Roman" panose="02020603050405020304" pitchFamily="18" charset="0"/>
+              </a:rPr>
+              <a:t>Tunnel</a:t>
+            </a:r>
+            <a:r>
+              <a:rPr lang="pt-BR" sz="1200" i="1" dirty="0">
+                <a:latin typeface="Times New Roman" panose="02020603050405020304" pitchFamily="18" charset="0"/>
+                <a:cs typeface="Times New Roman" panose="02020603050405020304" pitchFamily="18" charset="0"/>
+              </a:rPr>
+              <a:t> </a:t>
+            </a:r>
+            <a:r>
+              <a:rPr lang="pt-BR" sz="1200" i="1" dirty="0" err="1">
+                <a:latin typeface="Times New Roman" panose="02020603050405020304" pitchFamily="18" charset="0"/>
+                <a:cs typeface="Times New Roman" panose="02020603050405020304" pitchFamily="18" charset="0"/>
+              </a:rPr>
+              <a:t>Boring</a:t>
+            </a:r>
+            <a:r>
+              <a:rPr lang="pt-BR" sz="1200" i="1" dirty="0">
+                <a:latin typeface="Times New Roman" panose="02020603050405020304" pitchFamily="18" charset="0"/>
+                <a:cs typeface="Times New Roman" panose="02020603050405020304" pitchFamily="18" charset="0"/>
+              </a:rPr>
+              <a:t> </a:t>
+            </a:r>
+            <a:r>
+              <a:rPr lang="pt-BR" sz="1200" i="1" dirty="0" err="1">
+                <a:latin typeface="Times New Roman" panose="02020603050405020304" pitchFamily="18" charset="0"/>
+                <a:cs typeface="Times New Roman" panose="02020603050405020304" pitchFamily="18" charset="0"/>
+              </a:rPr>
+              <a:t>Machine</a:t>
+            </a:r>
+            <a:r>
+              <a:rPr lang="pt-BR" sz="1200" dirty="0">
+                <a:latin typeface="Times New Roman" panose="02020603050405020304" pitchFamily="18" charset="0"/>
+                <a:cs typeface="Times New Roman" panose="02020603050405020304" pitchFamily="18" charset="0"/>
+              </a:rPr>
+              <a:t> – TBM)</a:t>
+            </a:r>
+          </a:p>
+        </p:txBody>
+      </p:sp>
+      <p:sp>
+        <p:nvSpPr>
+          <p:cNvPr id="22" name="Retângulo 21">
+            <a:extLst>
+              <a:ext uri="{FF2B5EF4-FFF2-40B4-BE49-F238E27FC236}">
+                <a16:creationId xmlns:a16="http://schemas.microsoft.com/office/drawing/2014/main" id="{99C9A5C7-4070-4885-BD2E-C003FFD150A1}"/>
+              </a:ext>
+            </a:extLst>
+          </p:cNvPr>
+          <p:cNvSpPr/>
+          <p:nvPr/>
+        </p:nvSpPr>
+        <p:spPr>
+          <a:xfrm>
+            <a:off x="3923928" y="4797152"/>
+            <a:ext cx="2952328" cy="672075"/>
+          </a:xfrm>
+          <a:prstGeom prst="rect">
+            <a:avLst/>
+          </a:prstGeom>
+        </p:spPr>
+        <p:style>
+          <a:lnRef idx="2">
+            <a:schemeClr val="dk1"/>
+          </a:lnRef>
+          <a:fillRef idx="1">
+            <a:schemeClr val="lt1"/>
+          </a:fillRef>
+          <a:effectRef idx="0">
+            <a:schemeClr val="dk1"/>
+          </a:effectRef>
+          <a:fontRef idx="minor">
+            <a:schemeClr val="dk1"/>
+          </a:fontRef>
+        </p:style>
+        <p:txBody>
+          <a:bodyPr rtlCol="0" anchor="ctr"/>
+          <a:lstStyle/>
+          <a:p>
+            <a:r>
+              <a:rPr lang="pt-BR" sz="1200" b="1" dirty="0">
+                <a:latin typeface="Times New Roman" panose="02020603050405020304" pitchFamily="18" charset="0"/>
+                <a:cs typeface="Times New Roman" panose="02020603050405020304" pitchFamily="18" charset="0"/>
+              </a:rPr>
+              <a:t>2.2) CRAVAÇÃO DE TUBOS</a:t>
+            </a:r>
+          </a:p>
+          <a:p>
+            <a:r>
+              <a:rPr lang="pt-BR" sz="1200" dirty="0">
+                <a:latin typeface="Times New Roman" panose="02020603050405020304" pitchFamily="18" charset="0"/>
+                <a:cs typeface="Times New Roman" panose="02020603050405020304" pitchFamily="18" charset="0"/>
+              </a:rPr>
+              <a:t>(</a:t>
+            </a:r>
+            <a:r>
+              <a:rPr lang="pt-BR" sz="1200" i="1" dirty="0" err="1">
+                <a:latin typeface="Times New Roman" panose="02020603050405020304" pitchFamily="18" charset="0"/>
+                <a:cs typeface="Times New Roman" panose="02020603050405020304" pitchFamily="18" charset="0"/>
+              </a:rPr>
+              <a:t>Pipe</a:t>
+            </a:r>
+            <a:r>
+              <a:rPr lang="pt-BR" sz="1200" i="1" dirty="0">
+                <a:latin typeface="Times New Roman" panose="02020603050405020304" pitchFamily="18" charset="0"/>
+                <a:cs typeface="Times New Roman" panose="02020603050405020304" pitchFamily="18" charset="0"/>
+              </a:rPr>
+              <a:t> </a:t>
+            </a:r>
+            <a:r>
+              <a:rPr lang="pt-BR" sz="1200" i="1" dirty="0" err="1">
+                <a:latin typeface="Times New Roman" panose="02020603050405020304" pitchFamily="18" charset="0"/>
+                <a:cs typeface="Times New Roman" panose="02020603050405020304" pitchFamily="18" charset="0"/>
+              </a:rPr>
+              <a:t>and</a:t>
+            </a:r>
+            <a:r>
+              <a:rPr lang="pt-BR" sz="1200" i="1" dirty="0">
+                <a:latin typeface="Times New Roman" panose="02020603050405020304" pitchFamily="18" charset="0"/>
+                <a:cs typeface="Times New Roman" panose="02020603050405020304" pitchFamily="18" charset="0"/>
+              </a:rPr>
+              <a:t> Jack</a:t>
+            </a:r>
+            <a:r>
+              <a:rPr lang="pt-BR" sz="1200" dirty="0">
+                <a:latin typeface="Times New Roman" panose="02020603050405020304" pitchFamily="18" charset="0"/>
+                <a:cs typeface="Times New Roman" panose="02020603050405020304" pitchFamily="18" charset="0"/>
+              </a:rPr>
+              <a:t>)</a:t>
+            </a:r>
+          </a:p>
+        </p:txBody>
+      </p:sp>
+      <p:cxnSp>
+        <p:nvCxnSpPr>
+          <p:cNvPr id="8" name="Conector: Angulado 7">
+            <a:extLst>
+              <a:ext uri="{FF2B5EF4-FFF2-40B4-BE49-F238E27FC236}">
+                <a16:creationId xmlns:a16="http://schemas.microsoft.com/office/drawing/2014/main" id="{441EEF71-43F1-4967-ABFF-9E9DE22FBB6D}"/>
+              </a:ext>
+            </a:extLst>
+          </p:cNvPr>
+          <p:cNvCxnSpPr>
+            <a:cxnSpLocks/>
+            <a:stCxn id="2" idx="3"/>
+            <a:endCxn id="16" idx="1"/>
+          </p:cNvCxnSpPr>
+          <p:nvPr/>
+        </p:nvCxnSpPr>
+        <p:spPr>
+          <a:xfrm flipV="1">
+            <a:off x="2699792" y="1507644"/>
+            <a:ext cx="1224136" cy="1098216"/>
+          </a:xfrm>
+          <a:prstGeom prst="bentConnector3">
+            <a:avLst/>
+          </a:prstGeom>
+          <a:ln>
+            <a:tailEnd type="triangle" w="lg" len="lg"/>
+          </a:ln>
+        </p:spPr>
+        <p:style>
+          <a:lnRef idx="1">
+            <a:schemeClr val="dk1"/>
+          </a:lnRef>
+          <a:fillRef idx="0">
+            <a:schemeClr val="dk1"/>
+          </a:fillRef>
+          <a:effectRef idx="0">
+            <a:schemeClr val="dk1"/>
+          </a:effectRef>
+          <a:fontRef idx="minor">
+            <a:schemeClr val="tx1"/>
+          </a:fontRef>
+        </p:style>
+      </p:cxnSp>
+      <p:cxnSp>
+        <p:nvCxnSpPr>
+          <p:cNvPr id="12" name="Conector: Angulado 11">
+            <a:extLst>
+              <a:ext uri="{FF2B5EF4-FFF2-40B4-BE49-F238E27FC236}">
+                <a16:creationId xmlns:a16="http://schemas.microsoft.com/office/drawing/2014/main" id="{A2388B18-9FED-48F7-A25B-C44ABCE7D30B}"/>
+              </a:ext>
+            </a:extLst>
+          </p:cNvPr>
+          <p:cNvCxnSpPr>
+            <a:cxnSpLocks/>
+            <a:stCxn id="2" idx="3"/>
+            <a:endCxn id="19" idx="1"/>
+          </p:cNvCxnSpPr>
+          <p:nvPr/>
+        </p:nvCxnSpPr>
+        <p:spPr>
+          <a:xfrm>
+            <a:off x="2699792" y="2605860"/>
+            <a:ext cx="1224136" cy="1045165"/>
+          </a:xfrm>
+          <a:prstGeom prst="bentConnector3">
+            <a:avLst/>
+          </a:prstGeom>
+          <a:ln>
+            <a:tailEnd type="triangle" w="lg" len="lg"/>
+          </a:ln>
+        </p:spPr>
+        <p:style>
+          <a:lnRef idx="1">
+            <a:schemeClr val="dk1"/>
+          </a:lnRef>
+          <a:fillRef idx="0">
+            <a:schemeClr val="dk1"/>
+          </a:fillRef>
+          <a:effectRef idx="0">
+            <a:schemeClr val="dk1"/>
+          </a:effectRef>
+          <a:fontRef idx="minor">
+            <a:schemeClr val="tx1"/>
+          </a:fontRef>
+        </p:style>
+      </p:cxnSp>
+      <p:cxnSp>
+        <p:nvCxnSpPr>
+          <p:cNvPr id="24" name="Conector: Angulado 23">
+            <a:extLst>
+              <a:ext uri="{FF2B5EF4-FFF2-40B4-BE49-F238E27FC236}">
+                <a16:creationId xmlns:a16="http://schemas.microsoft.com/office/drawing/2014/main" id="{4D868515-0377-4D2A-8599-1D6676F86554}"/>
+              </a:ext>
+            </a:extLst>
+          </p:cNvPr>
+          <p:cNvCxnSpPr>
+            <a:cxnSpLocks/>
+            <a:stCxn id="2" idx="3"/>
+            <a:endCxn id="18" idx="1"/>
+          </p:cNvCxnSpPr>
+          <p:nvPr/>
+        </p:nvCxnSpPr>
+        <p:spPr>
+          <a:xfrm>
+            <a:off x="2699792" y="2605860"/>
+            <a:ext cx="1224136" cy="7050"/>
+          </a:xfrm>
+          <a:prstGeom prst="bentConnector3">
+            <a:avLst/>
+          </a:prstGeom>
+          <a:ln>
+            <a:tailEnd type="triangle" w="lg" len="lg"/>
+          </a:ln>
+        </p:spPr>
+        <p:style>
+          <a:lnRef idx="1">
+            <a:schemeClr val="dk1"/>
+          </a:lnRef>
+          <a:fillRef idx="0">
+            <a:schemeClr val="dk1"/>
+          </a:fillRef>
+          <a:effectRef idx="0">
+            <a:schemeClr val="dk1"/>
+          </a:effectRef>
+          <a:fontRef idx="minor">
+            <a:schemeClr val="tx1"/>
+          </a:fontRef>
+        </p:style>
+      </p:cxnSp>
+      <p:cxnSp>
+        <p:nvCxnSpPr>
+          <p:cNvPr id="33" name="Conector: Angulado 32">
+            <a:extLst>
+              <a:ext uri="{FF2B5EF4-FFF2-40B4-BE49-F238E27FC236}">
+                <a16:creationId xmlns:a16="http://schemas.microsoft.com/office/drawing/2014/main" id="{E56B640A-BAA1-4F79-98DE-0575636929A0}"/>
+              </a:ext>
+            </a:extLst>
+          </p:cNvPr>
+          <p:cNvCxnSpPr>
+            <a:cxnSpLocks/>
+            <a:stCxn id="14" idx="3"/>
+            <a:endCxn id="22" idx="1"/>
+          </p:cNvCxnSpPr>
+          <p:nvPr/>
+        </p:nvCxnSpPr>
+        <p:spPr>
+          <a:xfrm>
+            <a:off x="2708300" y="4754195"/>
+            <a:ext cx="1215628" cy="378995"/>
+          </a:xfrm>
+          <a:prstGeom prst="bentConnector3">
+            <a:avLst/>
+          </a:prstGeom>
+          <a:ln>
+            <a:tailEnd type="triangle" w="lg" len="lg"/>
+          </a:ln>
+        </p:spPr>
+        <p:style>
+          <a:lnRef idx="1">
+            <a:schemeClr val="dk1"/>
+          </a:lnRef>
+          <a:fillRef idx="0">
+            <a:schemeClr val="dk1"/>
+          </a:fillRef>
+          <a:effectRef idx="0">
+            <a:schemeClr val="dk1"/>
+          </a:effectRef>
+          <a:fontRef idx="minor">
+            <a:schemeClr val="tx1"/>
+          </a:fontRef>
+        </p:style>
+      </p:cxnSp>
+      <p:cxnSp>
+        <p:nvCxnSpPr>
+          <p:cNvPr id="36" name="Conector: Angulado 35">
+            <a:extLst>
+              <a:ext uri="{FF2B5EF4-FFF2-40B4-BE49-F238E27FC236}">
+                <a16:creationId xmlns:a16="http://schemas.microsoft.com/office/drawing/2014/main" id="{C3E5ED75-2202-46E7-8E4C-A2575E5C97E4}"/>
+              </a:ext>
+            </a:extLst>
+          </p:cNvPr>
+          <p:cNvCxnSpPr>
+            <a:cxnSpLocks/>
+            <a:stCxn id="14" idx="3"/>
+            <a:endCxn id="20" idx="1"/>
+          </p:cNvCxnSpPr>
+          <p:nvPr/>
+        </p:nvCxnSpPr>
+        <p:spPr>
+          <a:xfrm flipV="1">
+            <a:off x="2708300" y="4363962"/>
+            <a:ext cx="1215628" cy="390233"/>
+          </a:xfrm>
+          <a:prstGeom prst="bentConnector3">
+            <a:avLst/>
+          </a:prstGeom>
+          <a:ln>
+            <a:tailEnd type="triangle" w="lg" len="lg"/>
+          </a:ln>
+        </p:spPr>
+        <p:style>
+          <a:lnRef idx="1">
+            <a:schemeClr val="dk1"/>
+          </a:lnRef>
+          <a:fillRef idx="0">
+            <a:schemeClr val="dk1"/>
+          </a:fillRef>
+          <a:effectRef idx="0">
+            <a:schemeClr val="dk1"/>
+          </a:effectRef>
+          <a:fontRef idx="minor">
+            <a:schemeClr val="tx1"/>
+          </a:fontRef>
+        </p:style>
+      </p:cxnSp>
+    </p:spTree>
+    <p:extLst>
+      <p:ext uri="{BB962C8B-B14F-4D97-AF65-F5344CB8AC3E}">
+        <p14:creationId xmlns:p14="http://schemas.microsoft.com/office/powerpoint/2010/main" val="2172341692"/>
+      </p:ext>
+    </p:extLst>
+  </p:cSld>
+  <p:clrMapOvr>
+    <a:masterClrMapping/>
+  </p:clrMapOvr>
+</p:sld>
+</file>
+
+<file path=ppt/slides/slide3.xml><?xml version="1.0" encoding="utf-8"?>
+<p:sld xmlns:a="http://schemas.openxmlformats.org/drawingml/2006/main" xmlns:r="http://schemas.openxmlformats.org/officeDocument/2006/relationships" xmlns:p="http://schemas.openxmlformats.org/presentationml/2006/main">
+  <p:cSld>
+    <p:spTree>
+      <p:nvGrpSpPr>
+        <p:cNvPr id="1" name=""/>
+        <p:cNvGrpSpPr/>
+        <p:nvPr/>
+      </p:nvGrpSpPr>
+      <p:grpSpPr>
+        <a:xfrm>
+          <a:off x="0" y="0"/>
+          <a:ext cx="0" cy="0"/>
+          <a:chOff x="0" y="0"/>
+          <a:chExt cx="0" cy="0"/>
+        </a:xfrm>
+      </p:grpSpPr>
+    </p:spTree>
+    <p:extLst>
+      <p:ext uri="{BB962C8B-B14F-4D97-AF65-F5344CB8AC3E}">
+        <p14:creationId xmlns:p14="http://schemas.microsoft.com/office/powerpoint/2010/main" val="2837093514"/>
       </p:ext>
     </p:extLst>
   </p:cSld>

</xml_diff>